<commit_message>
Add in regression curve and polynomial combinations
</commit_message>
<xml_diff>
--- a/docs/images/FinalReportCharts.pptx
+++ b/docs/images/FinalReportCharts.pptx
@@ -14,6 +14,7 @@
     <p:sldId id="262" r:id="rId8"/>
     <p:sldId id="258" r:id="rId9"/>
     <p:sldId id="263" r:id="rId10"/>
+    <p:sldId id="265" r:id="rId11"/>
   </p:sldIdLst>
   <p:sldSz cx="12192000" cy="6858000"/>
   <p:notesSz cx="6858000" cy="9144000"/>
@@ -2192,7 +2193,7 @@
           <a:p>
             <a:fld id="{96A3D2AD-4032-4BCB-95A5-82BD957A2F64}" type="datetimeFigureOut">
               <a:rPr lang="en-US" smtClean="0"/>
-              <a:t>6/14/2019</a:t>
+              <a:t>6/15/2019</a:t>
             </a:fld>
             <a:endParaRPr lang="en-US"/>
           </a:p>
@@ -2390,7 +2391,7 @@
           <a:p>
             <a:fld id="{96A3D2AD-4032-4BCB-95A5-82BD957A2F64}" type="datetimeFigureOut">
               <a:rPr lang="en-US" smtClean="0"/>
-              <a:t>6/14/2019</a:t>
+              <a:t>6/15/2019</a:t>
             </a:fld>
             <a:endParaRPr lang="en-US"/>
           </a:p>
@@ -2598,7 +2599,7 @@
           <a:p>
             <a:fld id="{96A3D2AD-4032-4BCB-95A5-82BD957A2F64}" type="datetimeFigureOut">
               <a:rPr lang="en-US" smtClean="0"/>
-              <a:t>6/14/2019</a:t>
+              <a:t>6/15/2019</a:t>
             </a:fld>
             <a:endParaRPr lang="en-US"/>
           </a:p>
@@ -2796,7 +2797,7 @@
           <a:p>
             <a:fld id="{96A3D2AD-4032-4BCB-95A5-82BD957A2F64}" type="datetimeFigureOut">
               <a:rPr lang="en-US" smtClean="0"/>
-              <a:t>6/14/2019</a:t>
+              <a:t>6/15/2019</a:t>
             </a:fld>
             <a:endParaRPr lang="en-US"/>
           </a:p>
@@ -3071,7 +3072,7 @@
           <a:p>
             <a:fld id="{96A3D2AD-4032-4BCB-95A5-82BD957A2F64}" type="datetimeFigureOut">
               <a:rPr lang="en-US" smtClean="0"/>
-              <a:t>6/14/2019</a:t>
+              <a:t>6/15/2019</a:t>
             </a:fld>
             <a:endParaRPr lang="en-US"/>
           </a:p>
@@ -3336,7 +3337,7 @@
           <a:p>
             <a:fld id="{96A3D2AD-4032-4BCB-95A5-82BD957A2F64}" type="datetimeFigureOut">
               <a:rPr lang="en-US" smtClean="0"/>
-              <a:t>6/14/2019</a:t>
+              <a:t>6/15/2019</a:t>
             </a:fld>
             <a:endParaRPr lang="en-US"/>
           </a:p>
@@ -3748,7 +3749,7 @@
           <a:p>
             <a:fld id="{96A3D2AD-4032-4BCB-95A5-82BD957A2F64}" type="datetimeFigureOut">
               <a:rPr lang="en-US" smtClean="0"/>
-              <a:t>6/14/2019</a:t>
+              <a:t>6/15/2019</a:t>
             </a:fld>
             <a:endParaRPr lang="en-US"/>
           </a:p>
@@ -3889,7 +3890,7 @@
           <a:p>
             <a:fld id="{96A3D2AD-4032-4BCB-95A5-82BD957A2F64}" type="datetimeFigureOut">
               <a:rPr lang="en-US" smtClean="0"/>
-              <a:t>6/14/2019</a:t>
+              <a:t>6/15/2019</a:t>
             </a:fld>
             <a:endParaRPr lang="en-US"/>
           </a:p>
@@ -4002,7 +4003,7 @@
           <a:p>
             <a:fld id="{96A3D2AD-4032-4BCB-95A5-82BD957A2F64}" type="datetimeFigureOut">
               <a:rPr lang="en-US" smtClean="0"/>
-              <a:t>6/14/2019</a:t>
+              <a:t>6/15/2019</a:t>
             </a:fld>
             <a:endParaRPr lang="en-US"/>
           </a:p>
@@ -4313,7 +4314,7 @@
           <a:p>
             <a:fld id="{96A3D2AD-4032-4BCB-95A5-82BD957A2F64}" type="datetimeFigureOut">
               <a:rPr lang="en-US" smtClean="0"/>
-              <a:t>6/14/2019</a:t>
+              <a:t>6/15/2019</a:t>
             </a:fld>
             <a:endParaRPr lang="en-US"/>
           </a:p>
@@ -4601,7 +4602,7 @@
           <a:p>
             <a:fld id="{96A3D2AD-4032-4BCB-95A5-82BD957A2F64}" type="datetimeFigureOut">
               <a:rPr lang="en-US" smtClean="0"/>
-              <a:t>6/14/2019</a:t>
+              <a:t>6/15/2019</a:t>
             </a:fld>
             <a:endParaRPr lang="en-US"/>
           </a:p>
@@ -4842,7 +4843,7 @@
           <a:p>
             <a:fld id="{96A3D2AD-4032-4BCB-95A5-82BD957A2F64}" type="datetimeFigureOut">
               <a:rPr lang="en-US" smtClean="0"/>
-              <a:t>6/14/2019</a:t>
+              <a:t>6/15/2019</a:t>
             </a:fld>
             <a:endParaRPr lang="en-US"/>
           </a:p>
@@ -6295,6 +6296,906 @@
     <p:extLst>
       <p:ext uri="{BB962C8B-B14F-4D97-AF65-F5344CB8AC3E}">
         <p14:creationId xmlns:p14="http://schemas.microsoft.com/office/powerpoint/2010/main" val="1074039092"/>
+      </p:ext>
+    </p:extLst>
+  </p:cSld>
+  <p:clrMapOvr>
+    <a:masterClrMapping/>
+  </p:clrMapOvr>
+</p:sld>
+</file>
+
+<file path=ppt/slides/slide10.xml><?xml version="1.0" encoding="utf-8"?>
+<p:sld xmlns:a="http://schemas.openxmlformats.org/drawingml/2006/main" xmlns:r="http://schemas.openxmlformats.org/officeDocument/2006/relationships" xmlns:p="http://schemas.openxmlformats.org/presentationml/2006/main">
+  <p:cSld>
+    <p:spTree>
+      <p:nvGrpSpPr>
+        <p:cNvPr id="1" name=""/>
+        <p:cNvGrpSpPr/>
+        <p:nvPr/>
+      </p:nvGrpSpPr>
+      <p:grpSpPr>
+        <a:xfrm>
+          <a:off x="0" y="0"/>
+          <a:ext cx="0" cy="0"/>
+          <a:chOff x="0" y="0"/>
+          <a:chExt cx="0" cy="0"/>
+        </a:xfrm>
+      </p:grpSpPr>
+      <p:pic>
+        <p:nvPicPr>
+          <p:cNvPr id="2" name="Picture 1" descr="A close up of a logo&#10;&#10;Description automatically generated">
+            <a:extLst>
+              <a:ext uri="{FF2B5EF4-FFF2-40B4-BE49-F238E27FC236}">
+                <a16:creationId xmlns:a16="http://schemas.microsoft.com/office/drawing/2014/main" id="{004B2CD1-5F27-4E3A-A5EB-6F6394E67664}"/>
+              </a:ext>
+            </a:extLst>
+          </p:cNvPr>
+          <p:cNvPicPr>
+            <a:picLocks noChangeAspect="1"/>
+          </p:cNvPicPr>
+          <p:nvPr/>
+        </p:nvPicPr>
+        <p:blipFill>
+          <a:blip r:embed="rId2">
+            <a:extLst>
+              <a:ext uri="{28A0092B-C50C-407E-A947-70E740481C1C}">
+                <a14:useLocalDpi xmlns:a14="http://schemas.microsoft.com/office/drawing/2010/main" val="0"/>
+              </a:ext>
+            </a:extLst>
+          </a:blip>
+          <a:stretch>
+            <a:fillRect/>
+          </a:stretch>
+        </p:blipFill>
+        <p:spPr>
+          <a:xfrm>
+            <a:off x="5814435" y="1711033"/>
+            <a:ext cx="563130" cy="563130"/>
+          </a:xfrm>
+          <a:prstGeom prst="rect">
+            <a:avLst/>
+          </a:prstGeom>
+        </p:spPr>
+      </p:pic>
+      <p:pic>
+        <p:nvPicPr>
+          <p:cNvPr id="3" name="Picture 2">
+            <a:extLst>
+              <a:ext uri="{FF2B5EF4-FFF2-40B4-BE49-F238E27FC236}">
+                <a16:creationId xmlns:a16="http://schemas.microsoft.com/office/drawing/2014/main" id="{DD039B37-161C-46BF-94B8-D4728736419D}"/>
+              </a:ext>
+            </a:extLst>
+          </p:cNvPr>
+          <p:cNvPicPr>
+            <a:picLocks noChangeAspect="1"/>
+          </p:cNvPicPr>
+          <p:nvPr/>
+        </p:nvPicPr>
+        <p:blipFill>
+          <a:blip r:embed="rId3">
+            <a:extLst>
+              <a:ext uri="{28A0092B-C50C-407E-A947-70E740481C1C}">
+                <a14:useLocalDpi xmlns:a14="http://schemas.microsoft.com/office/drawing/2010/main" val="0"/>
+              </a:ext>
+            </a:extLst>
+          </a:blip>
+          <a:stretch>
+            <a:fillRect/>
+          </a:stretch>
+        </p:blipFill>
+        <p:spPr>
+          <a:xfrm>
+            <a:off x="5814435" y="4619911"/>
+            <a:ext cx="563130" cy="563130"/>
+          </a:xfrm>
+          <a:prstGeom prst="rect">
+            <a:avLst/>
+          </a:prstGeom>
+        </p:spPr>
+      </p:pic>
+      <p:cxnSp>
+        <p:nvCxnSpPr>
+          <p:cNvPr id="4" name="Straight Arrow Connector 3">
+            <a:extLst>
+              <a:ext uri="{FF2B5EF4-FFF2-40B4-BE49-F238E27FC236}">
+                <a16:creationId xmlns:a16="http://schemas.microsoft.com/office/drawing/2014/main" id="{6A8027A8-FF44-450F-9360-58510CBA3CCF}"/>
+              </a:ext>
+            </a:extLst>
+          </p:cNvPr>
+          <p:cNvCxnSpPr>
+            <a:cxnSpLocks/>
+          </p:cNvCxnSpPr>
+          <p:nvPr/>
+        </p:nvCxnSpPr>
+        <p:spPr>
+          <a:xfrm flipH="1" flipV="1">
+            <a:off x="5073218" y="969816"/>
+            <a:ext cx="741217" cy="741217"/>
+          </a:xfrm>
+          <a:prstGeom prst="straightConnector1">
+            <a:avLst/>
+          </a:prstGeom>
+          <a:ln w="50800">
+            <a:solidFill>
+              <a:schemeClr val="bg1">
+                <a:lumMod val="65000"/>
+              </a:schemeClr>
+            </a:solidFill>
+            <a:tailEnd type="triangle"/>
+          </a:ln>
+        </p:spPr>
+        <p:style>
+          <a:lnRef idx="1">
+            <a:schemeClr val="dk1"/>
+          </a:lnRef>
+          <a:fillRef idx="0">
+            <a:schemeClr val="dk1"/>
+          </a:fillRef>
+          <a:effectRef idx="0">
+            <a:schemeClr val="dk1"/>
+          </a:effectRef>
+          <a:fontRef idx="minor">
+            <a:schemeClr val="tx1"/>
+          </a:fontRef>
+        </p:style>
+      </p:cxnSp>
+      <p:cxnSp>
+        <p:nvCxnSpPr>
+          <p:cNvPr id="5" name="Straight Connector 9">
+            <a:extLst>
+              <a:ext uri="{FF2B5EF4-FFF2-40B4-BE49-F238E27FC236}">
+                <a16:creationId xmlns:a16="http://schemas.microsoft.com/office/drawing/2014/main" id="{6AE120E9-BB03-48C8-9202-59603C6A500D}"/>
+              </a:ext>
+            </a:extLst>
+          </p:cNvPr>
+          <p:cNvCxnSpPr>
+            <a:cxnSpLocks/>
+            <a:stCxn id="2" idx="1"/>
+          </p:cNvCxnSpPr>
+          <p:nvPr/>
+        </p:nvCxnSpPr>
+        <p:spPr>
+          <a:xfrm rot="10800000">
+            <a:off x="5073219" y="1033008"/>
+            <a:ext cx="741217" cy="959591"/>
+          </a:xfrm>
+          <a:prstGeom prst="bentConnector2">
+            <a:avLst/>
+          </a:prstGeom>
+          <a:ln w="25400">
+            <a:solidFill>
+              <a:schemeClr val="bg1">
+                <a:lumMod val="65000"/>
+              </a:schemeClr>
+            </a:solidFill>
+            <a:prstDash val="sysDash"/>
+          </a:ln>
+        </p:spPr>
+        <p:style>
+          <a:lnRef idx="1">
+            <a:schemeClr val="dk1"/>
+          </a:lnRef>
+          <a:fillRef idx="0">
+            <a:schemeClr val="dk1"/>
+          </a:fillRef>
+          <a:effectRef idx="0">
+            <a:schemeClr val="dk1"/>
+          </a:effectRef>
+          <a:fontRef idx="minor">
+            <a:schemeClr val="tx1"/>
+          </a:fontRef>
+        </p:style>
+      </p:cxnSp>
+      <p:cxnSp>
+        <p:nvCxnSpPr>
+          <p:cNvPr id="6" name="Straight Arrow Connector 5">
+            <a:extLst>
+              <a:ext uri="{FF2B5EF4-FFF2-40B4-BE49-F238E27FC236}">
+                <a16:creationId xmlns:a16="http://schemas.microsoft.com/office/drawing/2014/main" id="{F82C557F-1751-4032-92E5-FFB0F0CD09FB}"/>
+              </a:ext>
+            </a:extLst>
+          </p:cNvPr>
+          <p:cNvCxnSpPr>
+            <a:cxnSpLocks/>
+          </p:cNvCxnSpPr>
+          <p:nvPr/>
+        </p:nvCxnSpPr>
+        <p:spPr>
+          <a:xfrm flipV="1">
+            <a:off x="6096000" y="3446605"/>
+            <a:ext cx="0" cy="315767"/>
+          </a:xfrm>
+          <a:prstGeom prst="straightConnector1">
+            <a:avLst/>
+          </a:prstGeom>
+          <a:ln w="50800">
+            <a:tailEnd type="triangle"/>
+          </a:ln>
+        </p:spPr>
+        <p:style>
+          <a:lnRef idx="1">
+            <a:schemeClr val="dk1"/>
+          </a:lnRef>
+          <a:fillRef idx="0">
+            <a:schemeClr val="dk1"/>
+          </a:fillRef>
+          <a:effectRef idx="0">
+            <a:schemeClr val="dk1"/>
+          </a:effectRef>
+          <a:fontRef idx="minor">
+            <a:schemeClr val="tx1"/>
+          </a:fontRef>
+        </p:style>
+      </p:cxnSp>
+      <p:cxnSp>
+        <p:nvCxnSpPr>
+          <p:cNvPr id="7" name="Straight Connector 6">
+            <a:extLst>
+              <a:ext uri="{FF2B5EF4-FFF2-40B4-BE49-F238E27FC236}">
+                <a16:creationId xmlns:a16="http://schemas.microsoft.com/office/drawing/2014/main" id="{8151C054-046F-4C2A-9AD5-55F02D6B6AEA}"/>
+              </a:ext>
+            </a:extLst>
+          </p:cNvPr>
+          <p:cNvCxnSpPr>
+            <a:stCxn id="3" idx="0"/>
+          </p:cNvCxnSpPr>
+          <p:nvPr/>
+        </p:nvCxnSpPr>
+        <p:spPr>
+          <a:xfrm flipV="1">
+            <a:off x="6096000" y="3762372"/>
+            <a:ext cx="0" cy="857539"/>
+          </a:xfrm>
+          <a:prstGeom prst="line">
+            <a:avLst/>
+          </a:prstGeom>
+          <a:ln w="25400">
+            <a:prstDash val="sysDot"/>
+          </a:ln>
+        </p:spPr>
+        <p:style>
+          <a:lnRef idx="1">
+            <a:schemeClr val="dk1"/>
+          </a:lnRef>
+          <a:fillRef idx="0">
+            <a:schemeClr val="dk1"/>
+          </a:fillRef>
+          <a:effectRef idx="0">
+            <a:schemeClr val="dk1"/>
+          </a:effectRef>
+          <a:fontRef idx="minor">
+            <a:schemeClr val="tx1"/>
+          </a:fontRef>
+        </p:style>
+      </p:cxnSp>
+      <p:cxnSp>
+        <p:nvCxnSpPr>
+          <p:cNvPr id="8" name="Straight Connector 9">
+            <a:extLst>
+              <a:ext uri="{FF2B5EF4-FFF2-40B4-BE49-F238E27FC236}">
+                <a16:creationId xmlns:a16="http://schemas.microsoft.com/office/drawing/2014/main" id="{B0C0F80B-8333-4A3F-8396-7AE1271B047D}"/>
+              </a:ext>
+            </a:extLst>
+          </p:cNvPr>
+          <p:cNvCxnSpPr>
+            <a:cxnSpLocks/>
+          </p:cNvCxnSpPr>
+          <p:nvPr/>
+        </p:nvCxnSpPr>
+        <p:spPr>
+          <a:xfrm rot="16200000" flipV="1">
+            <a:off x="6107289" y="3423721"/>
+            <a:ext cx="1022782" cy="1022781"/>
+          </a:xfrm>
+          <a:prstGeom prst="bentConnector3">
+            <a:avLst>
+              <a:gd name="adj1" fmla="val 99049"/>
+            </a:avLst>
+          </a:prstGeom>
+          <a:ln w="25400">
+            <a:solidFill>
+              <a:schemeClr val="bg1">
+                <a:lumMod val="65000"/>
+              </a:schemeClr>
+            </a:solidFill>
+            <a:prstDash val="sysDash"/>
+          </a:ln>
+        </p:spPr>
+        <p:style>
+          <a:lnRef idx="1">
+            <a:schemeClr val="dk1"/>
+          </a:lnRef>
+          <a:fillRef idx="0">
+            <a:schemeClr val="dk1"/>
+          </a:fillRef>
+          <a:effectRef idx="0">
+            <a:schemeClr val="dk1"/>
+          </a:effectRef>
+          <a:fontRef idx="minor">
+            <a:schemeClr val="tx1"/>
+          </a:fontRef>
+        </p:style>
+      </p:cxnSp>
+      <p:sp>
+        <p:nvSpPr>
+          <p:cNvPr id="10" name="Freeform: Shape 9">
+            <a:extLst>
+              <a:ext uri="{FF2B5EF4-FFF2-40B4-BE49-F238E27FC236}">
+                <a16:creationId xmlns:a16="http://schemas.microsoft.com/office/drawing/2014/main" id="{43D2E9AD-8B91-45BC-8839-29CC52238AE2}"/>
+              </a:ext>
+            </a:extLst>
+          </p:cNvPr>
+          <p:cNvSpPr/>
+          <p:nvPr/>
+        </p:nvSpPr>
+        <p:spPr>
+          <a:xfrm rot="2653449">
+            <a:off x="6115996" y="4297359"/>
+            <a:ext cx="600197" cy="265667"/>
+          </a:xfrm>
+          <a:custGeom>
+            <a:avLst/>
+            <a:gdLst>
+              <a:gd name="connsiteX0" fmla="*/ 212436 w 212436"/>
+              <a:gd name="connsiteY0" fmla="*/ 64713 h 64713"/>
+              <a:gd name="connsiteX1" fmla="*/ 101600 w 212436"/>
+              <a:gd name="connsiteY1" fmla="*/ 59 h 64713"/>
+              <a:gd name="connsiteX2" fmla="*/ 0 w 212436"/>
+              <a:gd name="connsiteY2" fmla="*/ 55477 h 64713"/>
+            </a:gdLst>
+            <a:ahLst/>
+            <a:cxnLst>
+              <a:cxn ang="0">
+                <a:pos x="connsiteX0" y="connsiteY0"/>
+              </a:cxn>
+              <a:cxn ang="0">
+                <a:pos x="connsiteX1" y="connsiteY1"/>
+              </a:cxn>
+              <a:cxn ang="0">
+                <a:pos x="connsiteX2" y="connsiteY2"/>
+              </a:cxn>
+            </a:cxnLst>
+            <a:rect l="l" t="t" r="r" b="b"/>
+            <a:pathLst>
+              <a:path w="212436" h="64713">
+                <a:moveTo>
+                  <a:pt x="212436" y="64713"/>
+                </a:moveTo>
+                <a:cubicBezTo>
+                  <a:pt x="174721" y="33155"/>
+                  <a:pt x="137006" y="1598"/>
+                  <a:pt x="101600" y="59"/>
+                </a:cubicBezTo>
+                <a:cubicBezTo>
+                  <a:pt x="66194" y="-1480"/>
+                  <a:pt x="33097" y="26998"/>
+                  <a:pt x="0" y="55477"/>
+                </a:cubicBezTo>
+              </a:path>
+            </a:pathLst>
+          </a:custGeom>
+          <a:noFill/>
+          <a:ln w="25400">
+            <a:solidFill>
+              <a:srgbClr val="00B050"/>
+            </a:solidFill>
+          </a:ln>
+        </p:spPr>
+        <p:style>
+          <a:lnRef idx="2">
+            <a:schemeClr val="accent1">
+              <a:shade val="50000"/>
+            </a:schemeClr>
+          </a:lnRef>
+          <a:fillRef idx="1">
+            <a:schemeClr val="accent1"/>
+          </a:fillRef>
+          <a:effectRef idx="0">
+            <a:schemeClr val="accent1"/>
+          </a:effectRef>
+          <a:fontRef idx="minor">
+            <a:schemeClr val="lt1"/>
+          </a:fontRef>
+        </p:style>
+        <p:txBody>
+          <a:bodyPr rtlCol="0" anchor="ctr"/>
+          <a:lstStyle/>
+          <a:p>
+            <a:pPr algn="ctr"/>
+            <a:endParaRPr lang="en-US"/>
+          </a:p>
+        </p:txBody>
+      </p:sp>
+      <p:sp>
+        <p:nvSpPr>
+          <p:cNvPr id="11" name="TextBox 10">
+            <a:extLst>
+              <a:ext uri="{FF2B5EF4-FFF2-40B4-BE49-F238E27FC236}">
+                <a16:creationId xmlns:a16="http://schemas.microsoft.com/office/drawing/2014/main" id="{7F26AABE-23C3-43E9-9D34-51DF03F91736}"/>
+              </a:ext>
+            </a:extLst>
+          </p:cNvPr>
+          <p:cNvSpPr txBox="1"/>
+          <p:nvPr/>
+        </p:nvSpPr>
+        <p:spPr>
+          <a:xfrm>
+            <a:off x="5117162" y="1957590"/>
+            <a:ext cx="332509" cy="369332"/>
+          </a:xfrm>
+          <a:prstGeom prst="rect">
+            <a:avLst/>
+          </a:prstGeom>
+          <a:noFill/>
+        </p:spPr>
+        <p:txBody>
+          <a:bodyPr wrap="square" rtlCol="0">
+            <a:spAutoFit/>
+          </a:bodyPr>
+          <a:lstStyle/>
+          <a:p>
+            <a:r>
+              <a:rPr lang="en-US" dirty="0">
+                <a:latin typeface="Berlin Sans FB" panose="020E0602020502020306" pitchFamily="34" charset="0"/>
+              </a:rPr>
+              <a:t>X</a:t>
+            </a:r>
+          </a:p>
+        </p:txBody>
+      </p:sp>
+      <p:sp>
+        <p:nvSpPr>
+          <p:cNvPr id="12" name="TextBox 11">
+            <a:extLst>
+              <a:ext uri="{FF2B5EF4-FFF2-40B4-BE49-F238E27FC236}">
+                <a16:creationId xmlns:a16="http://schemas.microsoft.com/office/drawing/2014/main" id="{15D710D0-A2B3-44F7-AC0D-7B051F8D8726}"/>
+              </a:ext>
+            </a:extLst>
+          </p:cNvPr>
+          <p:cNvSpPr txBox="1"/>
+          <p:nvPr/>
+        </p:nvSpPr>
+        <p:spPr>
+          <a:xfrm>
+            <a:off x="4740708" y="1400210"/>
+            <a:ext cx="332509" cy="369332"/>
+          </a:xfrm>
+          <a:prstGeom prst="rect">
+            <a:avLst/>
+          </a:prstGeom>
+          <a:noFill/>
+        </p:spPr>
+        <p:txBody>
+          <a:bodyPr wrap="square" rtlCol="0">
+            <a:spAutoFit/>
+          </a:bodyPr>
+          <a:lstStyle/>
+          <a:p>
+            <a:r>
+              <a:rPr lang="en-US" dirty="0">
+                <a:latin typeface="Berlin Sans FB" panose="020E0602020502020306" pitchFamily="34" charset="0"/>
+              </a:rPr>
+              <a:t>Z</a:t>
+            </a:r>
+          </a:p>
+        </p:txBody>
+      </p:sp>
+      <p:sp>
+        <p:nvSpPr>
+          <p:cNvPr id="13" name="TextBox 12">
+            <a:extLst>
+              <a:ext uri="{FF2B5EF4-FFF2-40B4-BE49-F238E27FC236}">
+                <a16:creationId xmlns:a16="http://schemas.microsoft.com/office/drawing/2014/main" id="{09590425-8D2C-4DDC-A42B-00BF217065CE}"/>
+              </a:ext>
+            </a:extLst>
+          </p:cNvPr>
+          <p:cNvSpPr txBox="1"/>
+          <p:nvPr/>
+        </p:nvSpPr>
+        <p:spPr>
+          <a:xfrm>
+            <a:off x="6377565" y="3078185"/>
+            <a:ext cx="332509" cy="369332"/>
+          </a:xfrm>
+          <a:prstGeom prst="rect">
+            <a:avLst/>
+          </a:prstGeom>
+          <a:noFill/>
+        </p:spPr>
+        <p:txBody>
+          <a:bodyPr wrap="square" rtlCol="0">
+            <a:spAutoFit/>
+          </a:bodyPr>
+          <a:lstStyle/>
+          <a:p>
+            <a:r>
+              <a:rPr lang="en-US" dirty="0">
+                <a:latin typeface="Berlin Sans FB" panose="020E0602020502020306" pitchFamily="34" charset="0"/>
+              </a:rPr>
+              <a:t>X</a:t>
+            </a:r>
+          </a:p>
+        </p:txBody>
+      </p:sp>
+      <p:sp>
+        <p:nvSpPr>
+          <p:cNvPr id="14" name="TextBox 13">
+            <a:extLst>
+              <a:ext uri="{FF2B5EF4-FFF2-40B4-BE49-F238E27FC236}">
+                <a16:creationId xmlns:a16="http://schemas.microsoft.com/office/drawing/2014/main" id="{2448D773-971A-4F74-A3AE-595E57380F55}"/>
+              </a:ext>
+            </a:extLst>
+          </p:cNvPr>
+          <p:cNvSpPr txBox="1"/>
+          <p:nvPr/>
+        </p:nvSpPr>
+        <p:spPr>
+          <a:xfrm>
+            <a:off x="7141359" y="3702627"/>
+            <a:ext cx="332509" cy="369332"/>
+          </a:xfrm>
+          <a:prstGeom prst="rect">
+            <a:avLst/>
+          </a:prstGeom>
+          <a:noFill/>
+        </p:spPr>
+        <p:txBody>
+          <a:bodyPr wrap="square" rtlCol="0">
+            <a:spAutoFit/>
+          </a:bodyPr>
+          <a:lstStyle/>
+          <a:p>
+            <a:r>
+              <a:rPr lang="en-US" dirty="0">
+                <a:latin typeface="Berlin Sans FB" panose="020E0602020502020306" pitchFamily="34" charset="0"/>
+              </a:rPr>
+              <a:t>Z</a:t>
+            </a:r>
+          </a:p>
+        </p:txBody>
+      </p:sp>
+      <p:sp>
+        <p:nvSpPr>
+          <p:cNvPr id="16" name="TextBox 15">
+            <a:extLst>
+              <a:ext uri="{FF2B5EF4-FFF2-40B4-BE49-F238E27FC236}">
+                <a16:creationId xmlns:a16="http://schemas.microsoft.com/office/drawing/2014/main" id="{F2730241-9E77-4DD3-9E6F-7523416D4805}"/>
+              </a:ext>
+            </a:extLst>
+          </p:cNvPr>
+          <p:cNvSpPr txBox="1"/>
+          <p:nvPr/>
+        </p:nvSpPr>
+        <p:spPr>
+          <a:xfrm>
+            <a:off x="4801214" y="610230"/>
+            <a:ext cx="2589572" cy="377212"/>
+          </a:xfrm>
+          <a:prstGeom prst="rect">
+            <a:avLst/>
+          </a:prstGeom>
+          <a:noFill/>
+        </p:spPr>
+        <p:txBody>
+          <a:bodyPr wrap="square" rtlCol="0">
+            <a:spAutoFit/>
+          </a:bodyPr>
+          <a:lstStyle/>
+          <a:p>
+            <a:pPr algn="ctr"/>
+            <a:r>
+              <a:rPr lang="en-US" dirty="0">
+                <a:latin typeface="Berlin Sans FB" panose="020E0602020502020306" pitchFamily="34" charset="0"/>
+              </a:rPr>
+              <a:t>&lt;Distance, X, Z&gt;</a:t>
+            </a:r>
+          </a:p>
+        </p:txBody>
+      </p:sp>
+      <p:sp>
+        <p:nvSpPr>
+          <p:cNvPr id="17" name="TextBox 16">
+            <a:extLst>
+              <a:ext uri="{FF2B5EF4-FFF2-40B4-BE49-F238E27FC236}">
+                <a16:creationId xmlns:a16="http://schemas.microsoft.com/office/drawing/2014/main" id="{7EA2FD99-DFD6-422C-802C-E826236F8862}"/>
+              </a:ext>
+            </a:extLst>
+          </p:cNvPr>
+          <p:cNvSpPr txBox="1"/>
+          <p:nvPr/>
+        </p:nvSpPr>
+        <p:spPr>
+          <a:xfrm>
+            <a:off x="4294909" y="319890"/>
+            <a:ext cx="3602182" cy="369332"/>
+          </a:xfrm>
+          <a:prstGeom prst="rect">
+            <a:avLst/>
+          </a:prstGeom>
+          <a:noFill/>
+        </p:spPr>
+        <p:txBody>
+          <a:bodyPr wrap="square" rtlCol="0">
+            <a:spAutoFit/>
+          </a:bodyPr>
+          <a:lstStyle/>
+          <a:p>
+            <a:pPr algn="ctr"/>
+            <a:r>
+              <a:rPr lang="en-US" dirty="0">
+                <a:latin typeface="Berlin Sans FB" panose="020E0602020502020306" pitchFamily="34" charset="0"/>
+              </a:rPr>
+              <a:t>Horizontal Velocity Compensation</a:t>
+            </a:r>
+          </a:p>
+        </p:txBody>
+      </p:sp>
+      <p:sp>
+        <p:nvSpPr>
+          <p:cNvPr id="18" name="TextBox 17">
+            <a:extLst>
+              <a:ext uri="{FF2B5EF4-FFF2-40B4-BE49-F238E27FC236}">
+                <a16:creationId xmlns:a16="http://schemas.microsoft.com/office/drawing/2014/main" id="{1ADD1A82-C92D-4640-99DE-7D737618A00E}"/>
+              </a:ext>
+            </a:extLst>
+          </p:cNvPr>
+          <p:cNvSpPr txBox="1"/>
+          <p:nvPr/>
+        </p:nvSpPr>
+        <p:spPr>
+          <a:xfrm>
+            <a:off x="4488877" y="4304805"/>
+            <a:ext cx="1219341" cy="369332"/>
+          </a:xfrm>
+          <a:prstGeom prst="rect">
+            <a:avLst/>
+          </a:prstGeom>
+          <a:noFill/>
+          <a:ln w="38100">
+            <a:solidFill>
+              <a:schemeClr val="dk1"/>
+            </a:solidFill>
+          </a:ln>
+        </p:spPr>
+        <p:txBody>
+          <a:bodyPr wrap="square" rtlCol="0">
+            <a:spAutoFit/>
+          </a:bodyPr>
+          <a:lstStyle/>
+          <a:p>
+            <a:pPr algn="ctr"/>
+            <a:r>
+              <a:rPr lang="en-US" dirty="0">
+                <a:latin typeface="Berlin Sans FB" panose="020E0602020502020306" pitchFamily="34" charset="0"/>
+              </a:rPr>
+              <a:t>Predicted</a:t>
+            </a:r>
+          </a:p>
+        </p:txBody>
+      </p:sp>
+      <p:cxnSp>
+        <p:nvCxnSpPr>
+          <p:cNvPr id="19" name="Straight Connector 18">
+            <a:extLst>
+              <a:ext uri="{FF2B5EF4-FFF2-40B4-BE49-F238E27FC236}">
+                <a16:creationId xmlns:a16="http://schemas.microsoft.com/office/drawing/2014/main" id="{0726D50E-274F-4B72-90F4-42CDF8E9ED97}"/>
+              </a:ext>
+            </a:extLst>
+          </p:cNvPr>
+          <p:cNvCxnSpPr>
+            <a:cxnSpLocks/>
+            <a:stCxn id="18" idx="3"/>
+          </p:cNvCxnSpPr>
+          <p:nvPr/>
+        </p:nvCxnSpPr>
+        <p:spPr>
+          <a:xfrm flipV="1">
+            <a:off x="5708218" y="4463937"/>
+            <a:ext cx="596788" cy="25534"/>
+          </a:xfrm>
+          <a:prstGeom prst="line">
+            <a:avLst/>
+          </a:prstGeom>
+          <a:ln w="38100"/>
+        </p:spPr>
+        <p:style>
+          <a:lnRef idx="1">
+            <a:schemeClr val="dk1"/>
+          </a:lnRef>
+          <a:fillRef idx="0">
+            <a:schemeClr val="dk1"/>
+          </a:fillRef>
+          <a:effectRef idx="0">
+            <a:schemeClr val="dk1"/>
+          </a:effectRef>
+          <a:fontRef idx="minor">
+            <a:schemeClr val="tx1"/>
+          </a:fontRef>
+        </p:style>
+      </p:cxnSp>
+      <p:sp>
+        <p:nvSpPr>
+          <p:cNvPr id="21" name="Oval 20">
+            <a:extLst>
+              <a:ext uri="{FF2B5EF4-FFF2-40B4-BE49-F238E27FC236}">
+                <a16:creationId xmlns:a16="http://schemas.microsoft.com/office/drawing/2014/main" id="{37564D01-AB64-4AE6-88D6-23FF9DE678DD}"/>
+              </a:ext>
+            </a:extLst>
+          </p:cNvPr>
+          <p:cNvSpPr/>
+          <p:nvPr/>
+        </p:nvSpPr>
+        <p:spPr>
+          <a:xfrm>
+            <a:off x="7040883" y="4350865"/>
+            <a:ext cx="113072" cy="113072"/>
+          </a:xfrm>
+          <a:prstGeom prst="ellipse">
+            <a:avLst/>
+          </a:prstGeom>
+          <a:solidFill>
+            <a:srgbClr val="FF0000"/>
+          </a:solidFill>
+          <a:ln w="38100">
+            <a:noFill/>
+          </a:ln>
+        </p:spPr>
+        <p:style>
+          <a:lnRef idx="2">
+            <a:schemeClr val="accent1">
+              <a:shade val="50000"/>
+            </a:schemeClr>
+          </a:lnRef>
+          <a:fillRef idx="1">
+            <a:schemeClr val="accent1"/>
+          </a:fillRef>
+          <a:effectRef idx="0">
+            <a:schemeClr val="accent1"/>
+          </a:effectRef>
+          <a:fontRef idx="minor">
+            <a:schemeClr val="lt1"/>
+          </a:fontRef>
+        </p:style>
+        <p:txBody>
+          <a:bodyPr rot="0" spcFirstLastPara="0" vertOverflow="overflow" horzOverflow="overflow" vert="horz" wrap="square" lIns="91440" tIns="45720" rIns="91440" bIns="45720" numCol="1" spcCol="0" rtlCol="0" fromWordArt="0" anchor="ctr" anchorCtr="0" forceAA="0" compatLnSpc="1">
+            <a:prstTxWarp prst="textNoShape">
+              <a:avLst/>
+            </a:prstTxWarp>
+            <a:noAutofit/>
+          </a:bodyPr>
+          <a:lstStyle/>
+          <a:p>
+            <a:pPr algn="ctr"/>
+            <a:endParaRPr lang="en-US"/>
+          </a:p>
+        </p:txBody>
+      </p:sp>
+      <p:sp>
+        <p:nvSpPr>
+          <p:cNvPr id="22" name="TextBox 21">
+            <a:extLst>
+              <a:ext uri="{FF2B5EF4-FFF2-40B4-BE49-F238E27FC236}">
+                <a16:creationId xmlns:a16="http://schemas.microsoft.com/office/drawing/2014/main" id="{7D270146-619D-43CD-B054-4DC79AEE31DE}"/>
+              </a:ext>
+            </a:extLst>
+          </p:cNvPr>
+          <p:cNvSpPr txBox="1"/>
+          <p:nvPr/>
+        </p:nvSpPr>
+        <p:spPr>
+          <a:xfrm>
+            <a:off x="4294909" y="5356449"/>
+            <a:ext cx="3602182" cy="646331"/>
+          </a:xfrm>
+          <a:prstGeom prst="rect">
+            <a:avLst/>
+          </a:prstGeom>
+          <a:noFill/>
+        </p:spPr>
+        <p:txBody>
+          <a:bodyPr wrap="square" rtlCol="0">
+            <a:spAutoFit/>
+          </a:bodyPr>
+          <a:lstStyle/>
+          <a:p>
+            <a:pPr algn="ctr"/>
+            <a:r>
+              <a:rPr lang="en-US" dirty="0">
+                <a:latin typeface="Berlin Sans FB" panose="020E0602020502020306" pitchFamily="34" charset="0"/>
+              </a:rPr>
+              <a:t>(Agent learns to hit any target at red point with red velocity)</a:t>
+            </a:r>
+          </a:p>
+        </p:txBody>
+      </p:sp>
+      <p:cxnSp>
+        <p:nvCxnSpPr>
+          <p:cNvPr id="24" name="Straight Arrow Connector 23">
+            <a:extLst>
+              <a:ext uri="{FF2B5EF4-FFF2-40B4-BE49-F238E27FC236}">
+                <a16:creationId xmlns:a16="http://schemas.microsoft.com/office/drawing/2014/main" id="{78420883-C2E0-4DAB-AD4A-B0CB238FFDB8}"/>
+              </a:ext>
+            </a:extLst>
+          </p:cNvPr>
+          <p:cNvCxnSpPr/>
+          <p:nvPr/>
+        </p:nvCxnSpPr>
+        <p:spPr>
+          <a:xfrm flipH="1" flipV="1">
+            <a:off x="6139943" y="3446266"/>
+            <a:ext cx="957476" cy="957476"/>
+          </a:xfrm>
+          <a:prstGeom prst="straightConnector1">
+            <a:avLst/>
+          </a:prstGeom>
+          <a:ln w="28575">
+            <a:solidFill>
+              <a:srgbClr val="FF9393"/>
+            </a:solidFill>
+            <a:tailEnd type="triangle"/>
+          </a:ln>
+        </p:spPr>
+        <p:style>
+          <a:lnRef idx="1">
+            <a:schemeClr val="dk1"/>
+          </a:lnRef>
+          <a:fillRef idx="0">
+            <a:schemeClr val="dk1"/>
+          </a:fillRef>
+          <a:effectRef idx="0">
+            <a:schemeClr val="dk1"/>
+          </a:effectRef>
+          <a:fontRef idx="minor">
+            <a:schemeClr val="tx1"/>
+          </a:fontRef>
+        </p:style>
+      </p:cxnSp>
+      <p:cxnSp>
+        <p:nvCxnSpPr>
+          <p:cNvPr id="29" name="Straight Arrow Connector 28">
+            <a:extLst>
+              <a:ext uri="{FF2B5EF4-FFF2-40B4-BE49-F238E27FC236}">
+                <a16:creationId xmlns:a16="http://schemas.microsoft.com/office/drawing/2014/main" id="{19E2FC5C-1AFE-4A9B-A7D2-0C0807CE96F3}"/>
+              </a:ext>
+            </a:extLst>
+          </p:cNvPr>
+          <p:cNvCxnSpPr>
+            <a:endCxn id="21" idx="3"/>
+          </p:cNvCxnSpPr>
+          <p:nvPr/>
+        </p:nvCxnSpPr>
+        <p:spPr>
+          <a:xfrm flipV="1">
+            <a:off x="6139943" y="4447378"/>
+            <a:ext cx="917499" cy="454098"/>
+          </a:xfrm>
+          <a:prstGeom prst="straightConnector1">
+            <a:avLst/>
+          </a:prstGeom>
+          <a:ln w="38100">
+            <a:tailEnd type="triangle"/>
+          </a:ln>
+        </p:spPr>
+        <p:style>
+          <a:lnRef idx="1">
+            <a:schemeClr val="dk1"/>
+          </a:lnRef>
+          <a:fillRef idx="0">
+            <a:schemeClr val="dk1"/>
+          </a:fillRef>
+          <a:effectRef idx="0">
+            <a:schemeClr val="dk1"/>
+          </a:effectRef>
+          <a:fontRef idx="minor">
+            <a:schemeClr val="tx1"/>
+          </a:fontRef>
+        </p:style>
+      </p:cxnSp>
+    </p:spTree>
+    <p:extLst>
+      <p:ext uri="{BB962C8B-B14F-4D97-AF65-F5344CB8AC3E}">
+        <p14:creationId xmlns:p14="http://schemas.microsoft.com/office/powerpoint/2010/main" val="2432806890"/>
       </p:ext>
     </p:extLst>
   </p:cSld>

</xml_diff>